<commit_message>
add schedule and assessment sections
</commit_message>
<xml_diff>
--- a/Week1_Intro/Lecture1.pptx
+++ b/Week1_Intro/Lecture1.pptx
@@ -226,7 +226,7 @@
           <a:p>
             <a:fld id="{1C969E84-06CE-CF42-B9EB-AC8154B6235B}" type="datetimeFigureOut">
               <a:rPr lang="en-US" smtClean="0"/>
-              <a:t>9/17/25</a:t>
+              <a:t>9/22/25</a:t>
             </a:fld>
             <a:endParaRPr lang="en-US"/>
           </a:p>
@@ -1728,7 +1728,7 @@
           <a:p>
             <a:fld id="{F47401EE-D299-594D-82E7-4A93FB40D7FE}" type="datetimeFigureOut">
               <a:rPr lang="en-US" smtClean="0"/>
-              <a:t>9/17/25</a:t>
+              <a:t>9/22/25</a:t>
             </a:fld>
             <a:endParaRPr lang="en-US"/>
           </a:p>
@@ -1940,7 +1940,7 @@
           <a:p>
             <a:fld id="{F47401EE-D299-594D-82E7-4A93FB40D7FE}" type="datetimeFigureOut">
               <a:rPr lang="en-US" smtClean="0"/>
-              <a:t>9/17/25</a:t>
+              <a:t>9/22/25</a:t>
             </a:fld>
             <a:endParaRPr lang="en-US"/>
           </a:p>
@@ -2162,7 +2162,7 @@
           <a:p>
             <a:fld id="{F47401EE-D299-594D-82E7-4A93FB40D7FE}" type="datetimeFigureOut">
               <a:rPr lang="en-US" smtClean="0"/>
-              <a:t>9/17/25</a:t>
+              <a:t>9/22/25</a:t>
             </a:fld>
             <a:endParaRPr lang="en-US"/>
           </a:p>
@@ -2374,7 +2374,7 @@
           <a:p>
             <a:fld id="{F47401EE-D299-594D-82E7-4A93FB40D7FE}" type="datetimeFigureOut">
               <a:rPr lang="en-US" smtClean="0"/>
-              <a:t>9/17/25</a:t>
+              <a:t>9/22/25</a:t>
             </a:fld>
             <a:endParaRPr lang="en-US"/>
           </a:p>
@@ -2662,7 +2662,7 @@
           <a:p>
             <a:fld id="{F47401EE-D299-594D-82E7-4A93FB40D7FE}" type="datetimeFigureOut">
               <a:rPr lang="en-US" smtClean="0"/>
-              <a:t>9/17/25</a:t>
+              <a:t>9/22/25</a:t>
             </a:fld>
             <a:endParaRPr lang="en-US"/>
           </a:p>
@@ -2942,7 +2942,7 @@
           <a:p>
             <a:fld id="{F47401EE-D299-594D-82E7-4A93FB40D7FE}" type="datetimeFigureOut">
               <a:rPr lang="en-US" smtClean="0"/>
-              <a:t>9/17/25</a:t>
+              <a:t>9/22/25</a:t>
             </a:fld>
             <a:endParaRPr lang="en-US"/>
           </a:p>
@@ -3369,7 +3369,7 @@
           <a:p>
             <a:fld id="{F47401EE-D299-594D-82E7-4A93FB40D7FE}" type="datetimeFigureOut">
               <a:rPr lang="en-US" smtClean="0"/>
-              <a:t>9/17/25</a:t>
+              <a:t>9/22/25</a:t>
             </a:fld>
             <a:endParaRPr lang="en-US"/>
           </a:p>
@@ -3523,7 +3523,7 @@
           <a:p>
             <a:fld id="{F47401EE-D299-594D-82E7-4A93FB40D7FE}" type="datetimeFigureOut">
               <a:rPr lang="en-US" smtClean="0"/>
-              <a:t>9/17/25</a:t>
+              <a:t>9/22/25</a:t>
             </a:fld>
             <a:endParaRPr lang="en-US"/>
           </a:p>
@@ -3648,7 +3648,7 @@
           <a:p>
             <a:fld id="{F47401EE-D299-594D-82E7-4A93FB40D7FE}" type="datetimeFigureOut">
               <a:rPr lang="en-US" smtClean="0"/>
-              <a:t>9/17/25</a:t>
+              <a:t>9/22/25</a:t>
             </a:fld>
             <a:endParaRPr lang="en-US"/>
           </a:p>
@@ -3973,7 +3973,7 @@
           <a:p>
             <a:fld id="{F47401EE-D299-594D-82E7-4A93FB40D7FE}" type="datetimeFigureOut">
               <a:rPr lang="en-US" smtClean="0"/>
-              <a:t>9/17/25</a:t>
+              <a:t>9/22/25</a:t>
             </a:fld>
             <a:endParaRPr lang="en-US"/>
           </a:p>
@@ -4274,7 +4274,7 @@
           <a:p>
             <a:fld id="{F47401EE-D299-594D-82E7-4A93FB40D7FE}" type="datetimeFigureOut">
               <a:rPr lang="en-US" smtClean="0"/>
-              <a:t>9/17/25</a:t>
+              <a:t>9/22/25</a:t>
             </a:fld>
             <a:endParaRPr lang="en-US"/>
           </a:p>
@@ -4529,7 +4529,7 @@
           <a:p>
             <a:fld id="{F47401EE-D299-594D-82E7-4A93FB40D7FE}" type="datetimeFigureOut">
               <a:rPr lang="en-US" smtClean="0"/>
-              <a:t>9/17/25</a:t>
+              <a:t>9/22/25</a:t>
             </a:fld>
             <a:endParaRPr lang="en-US"/>
           </a:p>

</xml_diff>